<commit_message>
Updating slides for Lesson 4&6 and updating code for lsn 4.  Adding in microcorruption homework.
</commit_message>
<xml_diff>
--- a/notes/L6/Lsn6.pptx
+++ b/notes/L6/Lsn6.pptx
@@ -3881,7 +3881,7 @@
           <a:p>
             <a:pPr lvl="1" algn="l"/>
             <a:r>
-              <a:rPr lang="en-US" sz="2000" dirty="0" smtClean="0">
+              <a:rPr lang="en-US" sz="2000" dirty="0">
                 <a:solidFill>
                   <a:srgbClr val="0070C0"/>
                 </a:solidFill>
@@ -3890,7 +3890,7 @@
               <a:t>CompEx1</a:t>
             </a:r>
             <a:r>
-              <a:rPr lang="en-US" sz="2000" dirty="0" smtClean="0">
+              <a:rPr lang="en-US" sz="2000" dirty="0">
                 <a:solidFill>
                   <a:srgbClr val="0070C0"/>
                 </a:solidFill>
@@ -3904,16 +3904,7 @@
                 </a:solidFill>
                 <a:sym typeface="Wingdings" pitchFamily="2" charset="2"/>
               </a:rPr>
-              <a:t> due </a:t>
-            </a:r>
-            <a:r>
-              <a:rPr lang="en-US" sz="2000" dirty="0" smtClean="0">
-                <a:solidFill>
-                  <a:srgbClr val="0070C0"/>
-                </a:solidFill>
-                <a:sym typeface="Wingdings" pitchFamily="2" charset="2"/>
-              </a:rPr>
-              <a:t>today</a:t>
+              <a:t> due today</a:t>
             </a:r>
             <a:endParaRPr lang="en-US" sz="2000" dirty="0">
               <a:solidFill>
@@ -3929,7 +3920,15 @@
                   <a:srgbClr val="0070C0"/>
                 </a:solidFill>
               </a:rPr>
-              <a:t>Might want to start Assignment 3 (due lesson 8)</a:t>
+              <a:t>Might </a:t>
+            </a:r>
+            <a:r>
+              <a:rPr lang="en-US" sz="2000" dirty="0" smtClean="0">
+                <a:solidFill>
+                  <a:srgbClr val="0070C0"/>
+                </a:solidFill>
+              </a:rPr>
+              <a:t>want to start Assignment 3 (due lesson 8)</a:t>
             </a:r>
             <a:endParaRPr lang="en-US" sz="2000" dirty="0">
               <a:solidFill>
@@ -8177,12 +8176,12 @@
           <a:lstStyle/>
           <a:p>
             <a:r>
-              <a:rPr lang="en-US" dirty="0" smtClean="0">
+              <a:rPr lang="en-US" dirty="0">
                 <a:hlinkClick r:id="rId2"/>
               </a:rPr>
               <a:t>Worksheet</a:t>
             </a:r>
-            <a:endParaRPr lang="en-US" dirty="0" smtClean="0"/>
+            <a:endParaRPr lang="en-US" dirty="0"/>
           </a:p>
           <a:p>
             <a:endParaRPr lang="en-US" dirty="0">
@@ -8878,16 +8877,17 @@
                 <a:cs typeface="Courier New" pitchFamily="49" charset="0"/>
                 <a:hlinkClick r:id="rId3"/>
               </a:rPr>
-              <a:t>http://</a:t>
-            </a:r>
-            <a:r>
-              <a:rPr lang="en-US" sz="1400" dirty="0" smtClean="0">
-                <a:latin typeface="Courier New" pitchFamily="49" charset="0"/>
-                <a:cs typeface="Courier New" pitchFamily="49" charset="0"/>
-                <a:hlinkClick r:id="rId3"/>
-              </a:rPr>
-              <a:t>ecse.bd.psu.edu/cmpen352/lecture/code/badlec5.asm</a:t>
-            </a:r>
+              <a:t>http://ece.ninja/382/notes/L6/code/badlec5.asm</a:t>
+            </a:r>
+            <a:endParaRPr lang="en-US" sz="1400" dirty="0">
+              <a:latin typeface="Courier New" pitchFamily="49" charset="0"/>
+              <a:cs typeface="Courier New" pitchFamily="49" charset="0"/>
+            </a:endParaRPr>
+          </a:p>
+          <a:p>
+            <a:pPr marL="0" indent="0">
+              <a:buNone/>
+            </a:pPr>
             <a:endParaRPr lang="en-US" sz="1400" dirty="0" smtClean="0">
               <a:latin typeface="Courier New" pitchFamily="49" charset="0"/>
               <a:cs typeface="Courier New" pitchFamily="49" charset="0"/>
@@ -8897,6 +8897,109 @@
             <a:pPr marL="0" indent="0">
               <a:buNone/>
             </a:pPr>
+            <a:r>
+              <a:rPr lang="en-US" sz="1400" dirty="0" smtClean="0">
+                <a:latin typeface="Courier New" pitchFamily="49" charset="0"/>
+                <a:cs typeface="Courier New" pitchFamily="49" charset="0"/>
+              </a:rPr>
+              <a:t>; </a:t>
+            </a:r>
+            <a:r>
+              <a:rPr lang="en-US" sz="1400" dirty="0"/>
+              <a:t>intention was to have it generate a PWM waveform on the P1.0 pin attached</a:t>
+            </a:r>
+            <a:endParaRPr lang="en-US" sz="1400" dirty="0">
+              <a:latin typeface="Courier New" pitchFamily="49" charset="0"/>
+              <a:cs typeface="Courier New" pitchFamily="49" charset="0"/>
+            </a:endParaRPr>
+          </a:p>
+          <a:p>
+            <a:pPr marL="0" indent="0">
+              <a:buNone/>
+            </a:pPr>
+            <a:r>
+              <a:rPr lang="en-US" sz="1400" dirty="0">
+                <a:latin typeface="Courier New" pitchFamily="49" charset="0"/>
+                <a:cs typeface="Courier New" pitchFamily="49" charset="0"/>
+              </a:rPr>
+              <a:t>duty = 0x20;</a:t>
+            </a:r>
+          </a:p>
+          <a:p>
+            <a:pPr marL="0" indent="0">
+              <a:buNone/>
+            </a:pPr>
+            <a:r>
+              <a:rPr lang="en-US" sz="1400" dirty="0">
+                <a:latin typeface="Courier New" pitchFamily="49" charset="0"/>
+                <a:cs typeface="Courier New" pitchFamily="49" charset="0"/>
+              </a:rPr>
+              <a:t>while(1) {</a:t>
+            </a:r>
+          </a:p>
+          <a:p>
+            <a:pPr marL="0" indent="0">
+              <a:buNone/>
+            </a:pPr>
+            <a:r>
+              <a:rPr lang="en-US" sz="1400" dirty="0">
+                <a:latin typeface="Courier New" pitchFamily="49" charset="0"/>
+                <a:cs typeface="Courier New" pitchFamily="49" charset="0"/>
+              </a:rPr>
+              <a:t>    </a:t>
+            </a:r>
+            <a:r>
+              <a:rPr lang="en-US" sz="1400" dirty="0" err="1">
+                <a:latin typeface="Courier New" pitchFamily="49" charset="0"/>
+                <a:cs typeface="Courier New" pitchFamily="49" charset="0"/>
+              </a:rPr>
+              <a:t>cnt</a:t>
+            </a:r>
+            <a:r>
+              <a:rPr lang="en-US" sz="1400" dirty="0">
+                <a:latin typeface="Courier New" pitchFamily="49" charset="0"/>
+                <a:cs typeface="Courier New" pitchFamily="49" charset="0"/>
+              </a:rPr>
+              <a:t> = 0x40;</a:t>
+            </a:r>
+          </a:p>
+          <a:p>
+            <a:pPr marL="0" indent="0">
+              <a:buNone/>
+            </a:pPr>
+            <a:r>
+              <a:rPr lang="en-US" sz="1400" dirty="0">
+                <a:latin typeface="Courier New" pitchFamily="49" charset="0"/>
+                <a:cs typeface="Courier New" pitchFamily="49" charset="0"/>
+              </a:rPr>
+              <a:t>    P1.0 = 1;</a:t>
+            </a:r>
+          </a:p>
+          <a:p>
+            <a:pPr marL="0" indent="0">
+              <a:buNone/>
+            </a:pPr>
+            <a:r>
+              <a:rPr lang="en-US" sz="1400" dirty="0">
+                <a:latin typeface="Courier New" pitchFamily="49" charset="0"/>
+                <a:cs typeface="Courier New" pitchFamily="49" charset="0"/>
+              </a:rPr>
+              <a:t>    while (</a:t>
+            </a:r>
+            <a:r>
+              <a:rPr lang="en-US" sz="1400" dirty="0" err="1">
+                <a:latin typeface="Courier New" pitchFamily="49" charset="0"/>
+                <a:cs typeface="Courier New" pitchFamily="49" charset="0"/>
+              </a:rPr>
+              <a:t>cnt</a:t>
+            </a:r>
+            <a:r>
+              <a:rPr lang="en-US" sz="1400" dirty="0">
+                <a:latin typeface="Courier New" pitchFamily="49" charset="0"/>
+                <a:cs typeface="Courier New" pitchFamily="49" charset="0"/>
+              </a:rPr>
+              <a:t>&gt;duty)	</a:t>
+            </a:r>
             <a:endParaRPr lang="en-US" sz="1400" dirty="0" smtClean="0">
               <a:latin typeface="Courier New" pitchFamily="49" charset="0"/>
               <a:cs typeface="Courier New" pitchFamily="49" charset="0"/>
@@ -8907,16 +9010,127 @@
               <a:buNone/>
             </a:pPr>
             <a:r>
+              <a:rPr lang="en-US" sz="1400" dirty="0">
+                <a:latin typeface="Courier New" pitchFamily="49" charset="0"/>
+                <a:cs typeface="Courier New" pitchFamily="49" charset="0"/>
+              </a:rPr>
+              <a:t> </a:t>
+            </a:r>
+            <a:r>
               <a:rPr lang="en-US" sz="1400" dirty="0" smtClean="0">
                 <a:latin typeface="Courier New" pitchFamily="49" charset="0"/>
                 <a:cs typeface="Courier New" pitchFamily="49" charset="0"/>
               </a:rPr>
-              <a:t>; </a:t>
-            </a:r>
-            <a:r>
-              <a:rPr lang="en-US" sz="1400" dirty="0"/>
-              <a:t>intention was to have it generate a PWM waveform on the P1.0 pin attached</a:t>
-            </a:r>
+              <a:t>           </a:t>
+            </a:r>
+            <a:r>
+              <a:rPr lang="en-US" sz="1400" dirty="0" err="1" smtClean="0">
+                <a:latin typeface="Courier New" pitchFamily="49" charset="0"/>
+                <a:cs typeface="Courier New" pitchFamily="49" charset="0"/>
+              </a:rPr>
+              <a:t>cnt</a:t>
+            </a:r>
+            <a:r>
+              <a:rPr lang="en-US" sz="1400" dirty="0" smtClean="0">
+                <a:latin typeface="Courier New" pitchFamily="49" charset="0"/>
+                <a:cs typeface="Courier New" pitchFamily="49" charset="0"/>
+              </a:rPr>
+              <a:t>-</a:t>
+            </a:r>
+            <a:r>
+              <a:rPr lang="en-US" sz="1400" dirty="0">
+                <a:latin typeface="Courier New" pitchFamily="49" charset="0"/>
+                <a:cs typeface="Courier New" pitchFamily="49" charset="0"/>
+              </a:rPr>
+              <a:t>=1;</a:t>
+            </a:r>
+          </a:p>
+          <a:p>
+            <a:pPr marL="0" indent="0">
+              <a:buNone/>
+            </a:pPr>
+            <a:r>
+              <a:rPr lang="en-US" sz="1400" dirty="0">
+                <a:latin typeface="Courier New" pitchFamily="49" charset="0"/>
+                <a:cs typeface="Courier New" pitchFamily="49" charset="0"/>
+              </a:rPr>
+              <a:t>    P1.0 = 0;</a:t>
+            </a:r>
+          </a:p>
+          <a:p>
+            <a:pPr marL="0" indent="0">
+              <a:buNone/>
+            </a:pPr>
+            <a:r>
+              <a:rPr lang="en-US" sz="1400" dirty="0">
+                <a:latin typeface="Courier New" pitchFamily="49" charset="0"/>
+                <a:cs typeface="Courier New" pitchFamily="49" charset="0"/>
+              </a:rPr>
+              <a:t>    while (</a:t>
+            </a:r>
+            <a:r>
+              <a:rPr lang="en-US" sz="1400" dirty="0" err="1">
+                <a:latin typeface="Courier New" pitchFamily="49" charset="0"/>
+                <a:cs typeface="Courier New" pitchFamily="49" charset="0"/>
+              </a:rPr>
+              <a:t>cnt</a:t>
+            </a:r>
+            <a:r>
+              <a:rPr lang="en-US" sz="1400" dirty="0">
+                <a:latin typeface="Courier New" pitchFamily="49" charset="0"/>
+                <a:cs typeface="Courier New" pitchFamily="49" charset="0"/>
+              </a:rPr>
+              <a:t>&gt;0)	</a:t>
+            </a:r>
+            <a:endParaRPr lang="en-US" sz="1400" dirty="0" smtClean="0">
+              <a:latin typeface="Courier New" pitchFamily="49" charset="0"/>
+              <a:cs typeface="Courier New" pitchFamily="49" charset="0"/>
+            </a:endParaRPr>
+          </a:p>
+          <a:p>
+            <a:pPr marL="0" indent="0">
+              <a:buNone/>
+            </a:pPr>
+            <a:r>
+              <a:rPr lang="en-US" sz="1400" dirty="0">
+                <a:latin typeface="Courier New" pitchFamily="49" charset="0"/>
+                <a:cs typeface="Courier New" pitchFamily="49" charset="0"/>
+              </a:rPr>
+              <a:t> </a:t>
+            </a:r>
+            <a:r>
+              <a:rPr lang="en-US" sz="1400" dirty="0" smtClean="0">
+                <a:latin typeface="Courier New" pitchFamily="49" charset="0"/>
+                <a:cs typeface="Courier New" pitchFamily="49" charset="0"/>
+              </a:rPr>
+              <a:t>           </a:t>
+            </a:r>
+            <a:r>
+              <a:rPr lang="en-US" sz="1400" dirty="0" err="1" smtClean="0">
+                <a:latin typeface="Courier New" pitchFamily="49" charset="0"/>
+                <a:cs typeface="Courier New" pitchFamily="49" charset="0"/>
+              </a:rPr>
+              <a:t>cnt</a:t>
+            </a:r>
+            <a:r>
+              <a:rPr lang="en-US" sz="1400" dirty="0" smtClean="0">
+                <a:latin typeface="Courier New" pitchFamily="49" charset="0"/>
+                <a:cs typeface="Courier New" pitchFamily="49" charset="0"/>
+              </a:rPr>
+              <a:t>-</a:t>
+            </a:r>
+            <a:r>
+              <a:rPr lang="en-US" sz="1400" dirty="0">
+                <a:latin typeface="Courier New" pitchFamily="49" charset="0"/>
+                <a:cs typeface="Courier New" pitchFamily="49" charset="0"/>
+              </a:rPr>
+              <a:t>=1;</a:t>
+            </a:r>
+          </a:p>
+          <a:p>
+            <a:pPr marL="0" indent="0">
+              <a:buNone/>
+            </a:pPr>
             <a:endParaRPr lang="en-US" sz="1400" dirty="0">
               <a:latin typeface="Courier New" pitchFamily="49" charset="0"/>
               <a:cs typeface="Courier New" pitchFamily="49" charset="0"/>
@@ -8931,7 +9145,7 @@
                 <a:latin typeface="Courier New" pitchFamily="49" charset="0"/>
                 <a:cs typeface="Courier New" pitchFamily="49" charset="0"/>
               </a:rPr>
-              <a:t>duty = 0x20;</a:t>
+              <a:t>    if (P1.3 == 0) {</a:t>
             </a:r>
           </a:p>
           <a:p>
@@ -8943,7 +9157,7 @@
                 <a:latin typeface="Courier New" pitchFamily="49" charset="0"/>
                 <a:cs typeface="Courier New" pitchFamily="49" charset="0"/>
               </a:rPr>
-              <a:t>while(1) {</a:t>
+              <a:t>	    while (P1.3 == 0);</a:t>
             </a:r>
           </a:p>
           <a:p>
@@ -8955,21 +9169,19 @@
                 <a:latin typeface="Courier New" pitchFamily="49" charset="0"/>
                 <a:cs typeface="Courier New" pitchFamily="49" charset="0"/>
               </a:rPr>
-              <a:t>    </a:t>
-            </a:r>
-            <a:r>
-              <a:rPr lang="en-US" sz="1400" dirty="0" err="1">
-                <a:latin typeface="Courier New" pitchFamily="49" charset="0"/>
-                <a:cs typeface="Courier New" pitchFamily="49" charset="0"/>
-              </a:rPr>
-              <a:t>cnt</a:t>
-            </a:r>
+              <a:t>	    duty += 0x08;</a:t>
+            </a:r>
+          </a:p>
+          <a:p>
+            <a:pPr marL="0" indent="0">
+              <a:buNone/>
+            </a:pPr>
             <a:r>
               <a:rPr lang="en-US" sz="1400" dirty="0">
                 <a:latin typeface="Courier New" pitchFamily="49" charset="0"/>
                 <a:cs typeface="Courier New" pitchFamily="49" charset="0"/>
               </a:rPr>
-              <a:t> = 0x40;</a:t>
+              <a:t>	    duty &amp;= 0x3F;</a:t>
             </a:r>
           </a:p>
           <a:p>
@@ -8981,233 +9193,8 @@
                 <a:latin typeface="Courier New" pitchFamily="49" charset="0"/>
                 <a:cs typeface="Courier New" pitchFamily="49" charset="0"/>
               </a:rPr>
-              <a:t>    P1.0 = 1;</a:t>
-            </a:r>
-          </a:p>
-          <a:p>
-            <a:pPr marL="0" indent="0">
-              <a:buNone/>
-            </a:pPr>
-            <a:r>
-              <a:rPr lang="en-US" sz="1400" dirty="0">
-                <a:latin typeface="Courier New" pitchFamily="49" charset="0"/>
-                <a:cs typeface="Courier New" pitchFamily="49" charset="0"/>
-              </a:rPr>
-              <a:t>    while (</a:t>
-            </a:r>
-            <a:r>
-              <a:rPr lang="en-US" sz="1400" dirty="0" err="1">
-                <a:latin typeface="Courier New" pitchFamily="49" charset="0"/>
-                <a:cs typeface="Courier New" pitchFamily="49" charset="0"/>
-              </a:rPr>
-              <a:t>cnt</a:t>
-            </a:r>
-            <a:r>
-              <a:rPr lang="en-US" sz="1400" dirty="0">
-                <a:latin typeface="Courier New" pitchFamily="49" charset="0"/>
-                <a:cs typeface="Courier New" pitchFamily="49" charset="0"/>
-              </a:rPr>
-              <a:t>&gt;duty)	</a:t>
-            </a:r>
-            <a:endParaRPr lang="en-US" sz="1400" dirty="0" smtClean="0">
-              <a:latin typeface="Courier New" pitchFamily="49" charset="0"/>
-              <a:cs typeface="Courier New" pitchFamily="49" charset="0"/>
-            </a:endParaRPr>
-          </a:p>
-          <a:p>
-            <a:pPr marL="0" indent="0">
-              <a:buNone/>
-            </a:pPr>
-            <a:r>
-              <a:rPr lang="en-US" sz="1400" dirty="0">
-                <a:latin typeface="Courier New" pitchFamily="49" charset="0"/>
-                <a:cs typeface="Courier New" pitchFamily="49" charset="0"/>
-              </a:rPr>
-              <a:t> </a:t>
-            </a:r>
-            <a:r>
-              <a:rPr lang="en-US" sz="1400" dirty="0" smtClean="0">
-                <a:latin typeface="Courier New" pitchFamily="49" charset="0"/>
-                <a:cs typeface="Courier New" pitchFamily="49" charset="0"/>
-              </a:rPr>
-              <a:t>           </a:t>
-            </a:r>
-            <a:r>
-              <a:rPr lang="en-US" sz="1400" dirty="0" err="1" smtClean="0">
-                <a:latin typeface="Courier New" pitchFamily="49" charset="0"/>
-                <a:cs typeface="Courier New" pitchFamily="49" charset="0"/>
-              </a:rPr>
-              <a:t>cnt</a:t>
-            </a:r>
-            <a:r>
-              <a:rPr lang="en-US" sz="1400" dirty="0" smtClean="0">
-                <a:latin typeface="Courier New" pitchFamily="49" charset="0"/>
-                <a:cs typeface="Courier New" pitchFamily="49" charset="0"/>
-              </a:rPr>
-              <a:t>-</a:t>
-            </a:r>
-            <a:r>
-              <a:rPr lang="en-US" sz="1400" dirty="0">
-                <a:latin typeface="Courier New" pitchFamily="49" charset="0"/>
-                <a:cs typeface="Courier New" pitchFamily="49" charset="0"/>
-              </a:rPr>
-              <a:t>=1;</a:t>
-            </a:r>
-          </a:p>
-          <a:p>
-            <a:pPr marL="0" indent="0">
-              <a:buNone/>
-            </a:pPr>
-            <a:r>
-              <a:rPr lang="en-US" sz="1400" dirty="0">
-                <a:latin typeface="Courier New" pitchFamily="49" charset="0"/>
-                <a:cs typeface="Courier New" pitchFamily="49" charset="0"/>
-              </a:rPr>
-              <a:t>    P1.0 = 0;</a:t>
-            </a:r>
-          </a:p>
-          <a:p>
-            <a:pPr marL="0" indent="0">
-              <a:buNone/>
-            </a:pPr>
-            <a:r>
-              <a:rPr lang="en-US" sz="1400" dirty="0">
-                <a:latin typeface="Courier New" pitchFamily="49" charset="0"/>
-                <a:cs typeface="Courier New" pitchFamily="49" charset="0"/>
-              </a:rPr>
-              <a:t>    while (</a:t>
-            </a:r>
-            <a:r>
-              <a:rPr lang="en-US" sz="1400" dirty="0" err="1">
-                <a:latin typeface="Courier New" pitchFamily="49" charset="0"/>
-                <a:cs typeface="Courier New" pitchFamily="49" charset="0"/>
-              </a:rPr>
-              <a:t>cnt</a:t>
-            </a:r>
-            <a:r>
-              <a:rPr lang="en-US" sz="1400" dirty="0">
-                <a:latin typeface="Courier New" pitchFamily="49" charset="0"/>
-                <a:cs typeface="Courier New" pitchFamily="49" charset="0"/>
-              </a:rPr>
-              <a:t>&gt;0)	</a:t>
-            </a:r>
-            <a:endParaRPr lang="en-US" sz="1400" dirty="0" smtClean="0">
-              <a:latin typeface="Courier New" pitchFamily="49" charset="0"/>
-              <a:cs typeface="Courier New" pitchFamily="49" charset="0"/>
-            </a:endParaRPr>
-          </a:p>
-          <a:p>
-            <a:pPr marL="0" indent="0">
-              <a:buNone/>
-            </a:pPr>
-            <a:r>
-              <a:rPr lang="en-US" sz="1400" dirty="0">
-                <a:latin typeface="Courier New" pitchFamily="49" charset="0"/>
-                <a:cs typeface="Courier New" pitchFamily="49" charset="0"/>
-              </a:rPr>
-              <a:t> </a:t>
-            </a:r>
-            <a:r>
-              <a:rPr lang="en-US" sz="1400" dirty="0" smtClean="0">
-                <a:latin typeface="Courier New" pitchFamily="49" charset="0"/>
-                <a:cs typeface="Courier New" pitchFamily="49" charset="0"/>
-              </a:rPr>
-              <a:t>           </a:t>
-            </a:r>
-            <a:r>
-              <a:rPr lang="en-US" sz="1400" dirty="0" err="1" smtClean="0">
-                <a:latin typeface="Courier New" pitchFamily="49" charset="0"/>
-                <a:cs typeface="Courier New" pitchFamily="49" charset="0"/>
-              </a:rPr>
-              <a:t>cnt</a:t>
-            </a:r>
-            <a:r>
-              <a:rPr lang="en-US" sz="1400" dirty="0" smtClean="0">
-                <a:latin typeface="Courier New" pitchFamily="49" charset="0"/>
-                <a:cs typeface="Courier New" pitchFamily="49" charset="0"/>
-              </a:rPr>
-              <a:t>-</a:t>
-            </a:r>
-            <a:r>
-              <a:rPr lang="en-US" sz="1400" dirty="0">
-                <a:latin typeface="Courier New" pitchFamily="49" charset="0"/>
-                <a:cs typeface="Courier New" pitchFamily="49" charset="0"/>
-              </a:rPr>
-              <a:t>=1;</a:t>
-            </a:r>
-          </a:p>
-          <a:p>
-            <a:pPr marL="0" indent="0">
-              <a:buNone/>
-            </a:pPr>
-            <a:endParaRPr lang="en-US" sz="1400" dirty="0">
-              <a:latin typeface="Courier New" pitchFamily="49" charset="0"/>
-              <a:cs typeface="Courier New" pitchFamily="49" charset="0"/>
-            </a:endParaRPr>
-          </a:p>
-          <a:p>
-            <a:pPr marL="0" indent="0">
-              <a:buNone/>
-            </a:pPr>
-            <a:r>
-              <a:rPr lang="en-US" sz="1400" dirty="0">
-                <a:latin typeface="Courier New" pitchFamily="49" charset="0"/>
-                <a:cs typeface="Courier New" pitchFamily="49" charset="0"/>
-              </a:rPr>
-              <a:t>    if (P1.3 == 0) {</a:t>
-            </a:r>
-          </a:p>
-          <a:p>
-            <a:pPr marL="0" indent="0">
-              <a:buNone/>
-            </a:pPr>
-            <a:r>
-              <a:rPr lang="en-US" sz="1400" dirty="0">
-                <a:latin typeface="Courier New" pitchFamily="49" charset="0"/>
-                <a:cs typeface="Courier New" pitchFamily="49" charset="0"/>
-              </a:rPr>
-              <a:t>	    while (P1.3 == 0);</a:t>
-            </a:r>
-          </a:p>
-          <a:p>
-            <a:pPr marL="0" indent="0">
-              <a:buNone/>
-            </a:pPr>
-            <a:r>
-              <a:rPr lang="en-US" sz="1400" dirty="0">
-                <a:latin typeface="Courier New" pitchFamily="49" charset="0"/>
-                <a:cs typeface="Courier New" pitchFamily="49" charset="0"/>
-              </a:rPr>
-              <a:t>	    duty += 0x08;</a:t>
-            </a:r>
-          </a:p>
-          <a:p>
-            <a:pPr marL="0" indent="0">
-              <a:buNone/>
-            </a:pPr>
-            <a:r>
-              <a:rPr lang="en-US" sz="1400" dirty="0">
-                <a:latin typeface="Courier New" pitchFamily="49" charset="0"/>
-                <a:cs typeface="Courier New" pitchFamily="49" charset="0"/>
-              </a:rPr>
-              <a:t>	    duty &amp;= 0x3F;</a:t>
-            </a:r>
-          </a:p>
-          <a:p>
-            <a:pPr marL="0" indent="0">
-              <a:buNone/>
-            </a:pPr>
-            <a:r>
-              <a:rPr lang="en-US" sz="1400" dirty="0">
-                <a:latin typeface="Courier New" pitchFamily="49" charset="0"/>
-                <a:cs typeface="Courier New" pitchFamily="49" charset="0"/>
-              </a:rPr>
               <a:t>}   }</a:t>
             </a:r>
-            <a:endParaRPr lang="en-US" sz="1400" dirty="0">
-              <a:latin typeface="Courier New" pitchFamily="49" charset="0"/>
-              <a:cs typeface="Courier New" pitchFamily="49" charset="0"/>
-            </a:endParaRPr>
           </a:p>
         </p:txBody>
       </p:sp>
@@ -10725,16 +10712,16 @@
           <a:p>
             <a:pPr lvl="1" algn="l"/>
             <a:r>
-              <a:rPr lang="en-US" sz="2000" dirty="0" smtClean="0">
+              <a:rPr lang="en-US" sz="2000" dirty="0">
                 <a:solidFill>
                   <a:srgbClr val="0070C0"/>
                 </a:solidFill>
                 <a:hlinkClick r:id="rId2"/>
               </a:rPr>
-              <a:t>	CompEx1</a:t>
-            </a:r>
-            <a:r>
-              <a:rPr lang="en-US" sz="2000" dirty="0" smtClean="0">
+              <a:t>CompEx1</a:t>
+            </a:r>
+            <a:r>
+              <a:rPr lang="en-US" sz="2000" dirty="0">
                 <a:solidFill>
                   <a:srgbClr val="0070C0"/>
                 </a:solidFill>
@@ -10748,16 +10735,7 @@
                 </a:solidFill>
                 <a:sym typeface="Wingdings" pitchFamily="2" charset="2"/>
               </a:rPr>
-              <a:t> due </a:t>
-            </a:r>
-            <a:r>
-              <a:rPr lang="en-US" sz="2000" dirty="0" smtClean="0">
-                <a:solidFill>
-                  <a:srgbClr val="0070C0"/>
-                </a:solidFill>
-                <a:sym typeface="Wingdings" pitchFamily="2" charset="2"/>
-              </a:rPr>
-              <a:t>next lesson</a:t>
+              <a:t> due next lesson</a:t>
             </a:r>
             <a:endParaRPr lang="en-US" sz="2000" dirty="0">
               <a:solidFill>

</xml_diff>